<commit_message>
this is for the midterm
</commit_message>
<xml_diff>
--- a/Week 5/Joseph Kang WebDev midterm outline.pptx
+++ b/Week 5/Joseph Kang WebDev midterm outline.pptx
@@ -2,7 +2,7 @@
 <file path=ppt/presentation.xml><?xml version="1.0" encoding="utf-8"?>
 <p:presentation xmlns:a="http://schemas.openxmlformats.org/drawingml/2006/main" xmlns:r="http://schemas.openxmlformats.org/officeDocument/2006/relationships" xmlns:p="http://schemas.openxmlformats.org/presentationml/2006/main" saveSubsetFonts="1">
   <p:sldMasterIdLst>
-    <p:sldMasterId id="2147483648" r:id="rId1"/>
+    <p:sldMasterId id="2147483672" r:id="rId1"/>
   </p:sldMasterIdLst>
   <p:sldIdLst>
     <p:sldId id="256" r:id="rId2"/>
@@ -17,7 +17,7 @@
     <a:defPPr>
       <a:defRPr lang="en-US"/>
     </a:defPPr>
-    <a:lvl1pPr marL="0" algn="l" defTabSz="914400" rtl="0" eaLnBrk="1" latinLnBrk="0" hangingPunct="1">
+    <a:lvl1pPr marL="0" algn="l" defTabSz="457200" rtl="0" eaLnBrk="1" latinLnBrk="0" hangingPunct="1">
       <a:defRPr sz="1800" kern="1200">
         <a:solidFill>
           <a:schemeClr val="tx1"/>
@@ -27,7 +27,7 @@
         <a:cs typeface="+mn-cs"/>
       </a:defRPr>
     </a:lvl1pPr>
-    <a:lvl2pPr marL="457200" algn="l" defTabSz="914400" rtl="0" eaLnBrk="1" latinLnBrk="0" hangingPunct="1">
+    <a:lvl2pPr marL="457200" algn="l" defTabSz="457200" rtl="0" eaLnBrk="1" latinLnBrk="0" hangingPunct="1">
       <a:defRPr sz="1800" kern="1200">
         <a:solidFill>
           <a:schemeClr val="tx1"/>
@@ -37,7 +37,7 @@
         <a:cs typeface="+mn-cs"/>
       </a:defRPr>
     </a:lvl2pPr>
-    <a:lvl3pPr marL="914400" algn="l" defTabSz="914400" rtl="0" eaLnBrk="1" latinLnBrk="0" hangingPunct="1">
+    <a:lvl3pPr marL="914400" algn="l" defTabSz="457200" rtl="0" eaLnBrk="1" latinLnBrk="0" hangingPunct="1">
       <a:defRPr sz="1800" kern="1200">
         <a:solidFill>
           <a:schemeClr val="tx1"/>
@@ -47,7 +47,7 @@
         <a:cs typeface="+mn-cs"/>
       </a:defRPr>
     </a:lvl3pPr>
-    <a:lvl4pPr marL="1371600" algn="l" defTabSz="914400" rtl="0" eaLnBrk="1" latinLnBrk="0" hangingPunct="1">
+    <a:lvl4pPr marL="1371600" algn="l" defTabSz="457200" rtl="0" eaLnBrk="1" latinLnBrk="0" hangingPunct="1">
       <a:defRPr sz="1800" kern="1200">
         <a:solidFill>
           <a:schemeClr val="tx1"/>
@@ -57,7 +57,7 @@
         <a:cs typeface="+mn-cs"/>
       </a:defRPr>
     </a:lvl4pPr>
-    <a:lvl5pPr marL="1828800" algn="l" defTabSz="914400" rtl="0" eaLnBrk="1" latinLnBrk="0" hangingPunct="1">
+    <a:lvl5pPr marL="1828800" algn="l" defTabSz="457200" rtl="0" eaLnBrk="1" latinLnBrk="0" hangingPunct="1">
       <a:defRPr sz="1800" kern="1200">
         <a:solidFill>
           <a:schemeClr val="tx1"/>
@@ -67,7 +67,7 @@
         <a:cs typeface="+mn-cs"/>
       </a:defRPr>
     </a:lvl5pPr>
-    <a:lvl6pPr marL="2286000" algn="l" defTabSz="914400" rtl="0" eaLnBrk="1" latinLnBrk="0" hangingPunct="1">
+    <a:lvl6pPr marL="2286000" algn="l" defTabSz="457200" rtl="0" eaLnBrk="1" latinLnBrk="0" hangingPunct="1">
       <a:defRPr sz="1800" kern="1200">
         <a:solidFill>
           <a:schemeClr val="tx1"/>
@@ -77,7 +77,7 @@
         <a:cs typeface="+mn-cs"/>
       </a:defRPr>
     </a:lvl6pPr>
-    <a:lvl7pPr marL="2743200" algn="l" defTabSz="914400" rtl="0" eaLnBrk="1" latinLnBrk="0" hangingPunct="1">
+    <a:lvl7pPr marL="2743200" algn="l" defTabSz="457200" rtl="0" eaLnBrk="1" latinLnBrk="0" hangingPunct="1">
       <a:defRPr sz="1800" kern="1200">
         <a:solidFill>
           <a:schemeClr val="tx1"/>
@@ -87,7 +87,7 @@
         <a:cs typeface="+mn-cs"/>
       </a:defRPr>
     </a:lvl7pPr>
-    <a:lvl8pPr marL="3200400" algn="l" defTabSz="914400" rtl="0" eaLnBrk="1" latinLnBrk="0" hangingPunct="1">
+    <a:lvl8pPr marL="3200400" algn="l" defTabSz="457200" rtl="0" eaLnBrk="1" latinLnBrk="0" hangingPunct="1">
       <a:defRPr sz="1800" kern="1200">
         <a:solidFill>
           <a:schemeClr val="tx1"/>
@@ -97,7 +97,7 @@
         <a:cs typeface="+mn-cs"/>
       </a:defRPr>
     </a:lvl8pPr>
-    <a:lvl9pPr marL="3657600" algn="l" defTabSz="914400" rtl="0" eaLnBrk="1" latinLnBrk="0" hangingPunct="1">
+    <a:lvl9pPr marL="3657600" algn="l" defTabSz="457200" rtl="0" eaLnBrk="1" latinLnBrk="0" hangingPunct="1">
       <a:defRPr sz="1800" kern="1200">
         <a:solidFill>
           <a:schemeClr val="tx1"/>
@@ -130,13 +130,7 @@
       </p:grpSpPr>
       <p:sp>
         <p:nvSpPr>
-          <p:cNvPr id="2" name="Title 1">
-            <a:extLst>
-              <a:ext uri="{FF2B5EF4-FFF2-40B4-BE49-F238E27FC236}">
-                <a16:creationId xmlns:a16="http://schemas.microsoft.com/office/drawing/2014/main" id="{BC000B12-1773-28D6-F746-2C215DFA97CC}"/>
-              </a:ext>
-            </a:extLst>
-          </p:cNvPr>
+          <p:cNvPr id="2" name="Title 1"/>
           <p:cNvSpPr>
             <a:spLocks noGrp="1"/>
           </p:cNvSpPr>
@@ -162,18 +156,13 @@
               <a:rPr lang="en-US"/>
               <a:t>Click to edit Master title style</a:t>
             </a:r>
-          </a:p>
-        </p:txBody>
-      </p:sp>
-      <p:sp>
-        <p:nvSpPr>
-          <p:cNvPr id="3" name="Subtitle 2">
-            <a:extLst>
-              <a:ext uri="{FF2B5EF4-FFF2-40B4-BE49-F238E27FC236}">
-                <a16:creationId xmlns:a16="http://schemas.microsoft.com/office/drawing/2014/main" id="{7CD72DB0-BBF9-4500-127E-523AA6EE4245}"/>
-              </a:ext>
-            </a:extLst>
-          </p:cNvPr>
+            <a:endParaRPr lang="en-US" dirty="0"/>
+          </a:p>
+        </p:txBody>
+      </p:sp>
+      <p:sp>
+        <p:nvSpPr>
+          <p:cNvPr id="3" name="Subtitle 2"/>
           <p:cNvSpPr>
             <a:spLocks noGrp="1"/>
           </p:cNvSpPr>
@@ -232,18 +221,13 @@
               <a:rPr lang="en-US"/>
               <a:t>Click to edit Master subtitle style</a:t>
             </a:r>
-          </a:p>
-        </p:txBody>
-      </p:sp>
-      <p:sp>
-        <p:nvSpPr>
-          <p:cNvPr id="4" name="Date Placeholder 3">
-            <a:extLst>
-              <a:ext uri="{FF2B5EF4-FFF2-40B4-BE49-F238E27FC236}">
-                <a16:creationId xmlns:a16="http://schemas.microsoft.com/office/drawing/2014/main" id="{924AEC0E-47AD-AE4E-8963-14C0B36BBB37}"/>
-              </a:ext>
-            </a:extLst>
-          </p:cNvPr>
+            <a:endParaRPr lang="en-US" dirty="0"/>
+          </a:p>
+        </p:txBody>
+      </p:sp>
+      <p:sp>
+        <p:nvSpPr>
+          <p:cNvPr id="4" name="Date Placeholder 3"/>
           <p:cNvSpPr>
             <a:spLocks noGrp="1"/>
           </p:cNvSpPr>
@@ -266,13 +250,7 @@
       </p:sp>
       <p:sp>
         <p:nvSpPr>
-          <p:cNvPr id="5" name="Footer Placeholder 4">
-            <a:extLst>
-              <a:ext uri="{FF2B5EF4-FFF2-40B4-BE49-F238E27FC236}">
-                <a16:creationId xmlns:a16="http://schemas.microsoft.com/office/drawing/2014/main" id="{176F30B5-1424-456D-29A1-05CAACE550FB}"/>
-              </a:ext>
-            </a:extLst>
-          </p:cNvPr>
+          <p:cNvPr id="5" name="Footer Placeholder 4"/>
           <p:cNvSpPr>
             <a:spLocks noGrp="1"/>
           </p:cNvSpPr>
@@ -291,13 +269,7 @@
       </p:sp>
       <p:sp>
         <p:nvSpPr>
-          <p:cNvPr id="6" name="Slide Number Placeholder 5">
-            <a:extLst>
-              <a:ext uri="{FF2B5EF4-FFF2-40B4-BE49-F238E27FC236}">
-                <a16:creationId xmlns:a16="http://schemas.microsoft.com/office/drawing/2014/main" id="{9A8DF79A-0DDB-2219-1685-3ED133D3BF9E}"/>
-              </a:ext>
-            </a:extLst>
-          </p:cNvPr>
+          <p:cNvPr id="6" name="Slide Number Placeholder 5"/>
           <p:cNvSpPr>
             <a:spLocks noGrp="1"/>
           </p:cNvSpPr>
@@ -321,7 +293,7 @@
     </p:spTree>
     <p:extLst>
       <p:ext uri="{BB962C8B-B14F-4D97-AF65-F5344CB8AC3E}">
-        <p14:creationId xmlns:p14="http://schemas.microsoft.com/office/powerpoint/2010/main" val="2144457974"/>
+        <p14:creationId xmlns:p14="http://schemas.microsoft.com/office/powerpoint/2010/main" val="330776779"/>
       </p:ext>
     </p:extLst>
   </p:cSld>
@@ -350,13 +322,7 @@
       </p:grpSpPr>
       <p:sp>
         <p:nvSpPr>
-          <p:cNvPr id="2" name="Title 1">
-            <a:extLst>
-              <a:ext uri="{FF2B5EF4-FFF2-40B4-BE49-F238E27FC236}">
-                <a16:creationId xmlns:a16="http://schemas.microsoft.com/office/drawing/2014/main" id="{5284B9E9-4F9A-C314-301D-BDE3B6D08EB2}"/>
-              </a:ext>
-            </a:extLst>
-          </p:cNvPr>
+          <p:cNvPr id="2" name="Title 1"/>
           <p:cNvSpPr>
             <a:spLocks noGrp="1"/>
           </p:cNvSpPr>
@@ -373,18 +339,13 @@
               <a:rPr lang="en-US"/>
               <a:t>Click to edit Master title style</a:t>
             </a:r>
-          </a:p>
-        </p:txBody>
-      </p:sp>
-      <p:sp>
-        <p:nvSpPr>
-          <p:cNvPr id="3" name="Vertical Text Placeholder 2">
-            <a:extLst>
-              <a:ext uri="{FF2B5EF4-FFF2-40B4-BE49-F238E27FC236}">
-                <a16:creationId xmlns:a16="http://schemas.microsoft.com/office/drawing/2014/main" id="{F78FFFDE-A27B-1805-E26D-B2C1F635352D}"/>
-              </a:ext>
-            </a:extLst>
-          </p:cNvPr>
+            <a:endParaRPr lang="en-US" dirty="0"/>
+          </a:p>
+        </p:txBody>
+      </p:sp>
+      <p:sp>
+        <p:nvSpPr>
+          <p:cNvPr id="3" name="Vertical Text Placeholder 2"/>
           <p:cNvSpPr>
             <a:spLocks noGrp="1"/>
           </p:cNvSpPr>
@@ -430,18 +391,13 @@
               <a:rPr lang="en-US"/>
               <a:t>Fifth level</a:t>
             </a:r>
-          </a:p>
-        </p:txBody>
-      </p:sp>
-      <p:sp>
-        <p:nvSpPr>
-          <p:cNvPr id="4" name="Date Placeholder 3">
-            <a:extLst>
-              <a:ext uri="{FF2B5EF4-FFF2-40B4-BE49-F238E27FC236}">
-                <a16:creationId xmlns:a16="http://schemas.microsoft.com/office/drawing/2014/main" id="{78EFD833-9C21-7AD6-08A0-38AE27198661}"/>
-              </a:ext>
-            </a:extLst>
-          </p:cNvPr>
+            <a:endParaRPr lang="en-US" dirty="0"/>
+          </a:p>
+        </p:txBody>
+      </p:sp>
+      <p:sp>
+        <p:nvSpPr>
+          <p:cNvPr id="4" name="Date Placeholder 3"/>
           <p:cNvSpPr>
             <a:spLocks noGrp="1"/>
           </p:cNvSpPr>
@@ -464,13 +420,7 @@
       </p:sp>
       <p:sp>
         <p:nvSpPr>
-          <p:cNvPr id="5" name="Footer Placeholder 4">
-            <a:extLst>
-              <a:ext uri="{FF2B5EF4-FFF2-40B4-BE49-F238E27FC236}">
-                <a16:creationId xmlns:a16="http://schemas.microsoft.com/office/drawing/2014/main" id="{17ACD275-327D-AC18-A72F-85E8F314D77D}"/>
-              </a:ext>
-            </a:extLst>
-          </p:cNvPr>
+          <p:cNvPr id="5" name="Footer Placeholder 4"/>
           <p:cNvSpPr>
             <a:spLocks noGrp="1"/>
           </p:cNvSpPr>
@@ -489,13 +439,7 @@
       </p:sp>
       <p:sp>
         <p:nvSpPr>
-          <p:cNvPr id="6" name="Slide Number Placeholder 5">
-            <a:extLst>
-              <a:ext uri="{FF2B5EF4-FFF2-40B4-BE49-F238E27FC236}">
-                <a16:creationId xmlns:a16="http://schemas.microsoft.com/office/drawing/2014/main" id="{B8E90990-B2E9-F64D-203F-9E3AAF503A58}"/>
-              </a:ext>
-            </a:extLst>
-          </p:cNvPr>
+          <p:cNvPr id="6" name="Slide Number Placeholder 5"/>
           <p:cNvSpPr>
             <a:spLocks noGrp="1"/>
           </p:cNvSpPr>
@@ -519,7 +463,7 @@
     </p:spTree>
     <p:extLst>
       <p:ext uri="{BB962C8B-B14F-4D97-AF65-F5344CB8AC3E}">
-        <p14:creationId xmlns:p14="http://schemas.microsoft.com/office/powerpoint/2010/main" val="3184166497"/>
+        <p14:creationId xmlns:p14="http://schemas.microsoft.com/office/powerpoint/2010/main" val="2974816434"/>
       </p:ext>
     </p:extLst>
   </p:cSld>
@@ -548,13 +492,7 @@
       </p:grpSpPr>
       <p:sp>
         <p:nvSpPr>
-          <p:cNvPr id="2" name="Vertical Title 1">
-            <a:extLst>
-              <a:ext uri="{FF2B5EF4-FFF2-40B4-BE49-F238E27FC236}">
-                <a16:creationId xmlns:a16="http://schemas.microsoft.com/office/drawing/2014/main" id="{C3FDA8F2-43EB-77D3-6C89-5DF7327DBF30}"/>
-              </a:ext>
-            </a:extLst>
-          </p:cNvPr>
+          <p:cNvPr id="2" name="Vertical Title 1"/>
           <p:cNvSpPr>
             <a:spLocks noGrp="1"/>
           </p:cNvSpPr>
@@ -576,18 +514,13 @@
               <a:rPr lang="en-US"/>
               <a:t>Click to edit Master title style</a:t>
             </a:r>
-          </a:p>
-        </p:txBody>
-      </p:sp>
-      <p:sp>
-        <p:nvSpPr>
-          <p:cNvPr id="3" name="Vertical Text Placeholder 2">
-            <a:extLst>
-              <a:ext uri="{FF2B5EF4-FFF2-40B4-BE49-F238E27FC236}">
-                <a16:creationId xmlns:a16="http://schemas.microsoft.com/office/drawing/2014/main" id="{8D47CDFC-4F16-2966-2751-6E5C3C2CBAC3}"/>
-              </a:ext>
-            </a:extLst>
-          </p:cNvPr>
+            <a:endParaRPr lang="en-US" dirty="0"/>
+          </a:p>
+        </p:txBody>
+      </p:sp>
+      <p:sp>
+        <p:nvSpPr>
+          <p:cNvPr id="3" name="Vertical Text Placeholder 2"/>
           <p:cNvSpPr>
             <a:spLocks noGrp="1"/>
           </p:cNvSpPr>
@@ -638,18 +571,13 @@
               <a:rPr lang="en-US"/>
               <a:t>Fifth level</a:t>
             </a:r>
-          </a:p>
-        </p:txBody>
-      </p:sp>
-      <p:sp>
-        <p:nvSpPr>
-          <p:cNvPr id="4" name="Date Placeholder 3">
-            <a:extLst>
-              <a:ext uri="{FF2B5EF4-FFF2-40B4-BE49-F238E27FC236}">
-                <a16:creationId xmlns:a16="http://schemas.microsoft.com/office/drawing/2014/main" id="{A70FED90-EBF1-61E0-88C8-1B14BC91953E}"/>
-              </a:ext>
-            </a:extLst>
-          </p:cNvPr>
+            <a:endParaRPr lang="en-US" dirty="0"/>
+          </a:p>
+        </p:txBody>
+      </p:sp>
+      <p:sp>
+        <p:nvSpPr>
+          <p:cNvPr id="4" name="Date Placeholder 3"/>
           <p:cNvSpPr>
             <a:spLocks noGrp="1"/>
           </p:cNvSpPr>
@@ -672,13 +600,7 @@
       </p:sp>
       <p:sp>
         <p:nvSpPr>
-          <p:cNvPr id="5" name="Footer Placeholder 4">
-            <a:extLst>
-              <a:ext uri="{FF2B5EF4-FFF2-40B4-BE49-F238E27FC236}">
-                <a16:creationId xmlns:a16="http://schemas.microsoft.com/office/drawing/2014/main" id="{237482DD-DD4B-1D11-FD90-6E8667DB5F8E}"/>
-              </a:ext>
-            </a:extLst>
-          </p:cNvPr>
+          <p:cNvPr id="5" name="Footer Placeholder 4"/>
           <p:cNvSpPr>
             <a:spLocks noGrp="1"/>
           </p:cNvSpPr>
@@ -697,13 +619,7 @@
       </p:sp>
       <p:sp>
         <p:nvSpPr>
-          <p:cNvPr id="6" name="Slide Number Placeholder 5">
-            <a:extLst>
-              <a:ext uri="{FF2B5EF4-FFF2-40B4-BE49-F238E27FC236}">
-                <a16:creationId xmlns:a16="http://schemas.microsoft.com/office/drawing/2014/main" id="{36C8A813-784F-2DD3-E0A7-566FD4CC1052}"/>
-              </a:ext>
-            </a:extLst>
-          </p:cNvPr>
+          <p:cNvPr id="6" name="Slide Number Placeholder 5"/>
           <p:cNvSpPr>
             <a:spLocks noGrp="1"/>
           </p:cNvSpPr>
@@ -727,7 +643,7 @@
     </p:spTree>
     <p:extLst>
       <p:ext uri="{BB962C8B-B14F-4D97-AF65-F5344CB8AC3E}">
-        <p14:creationId xmlns:p14="http://schemas.microsoft.com/office/powerpoint/2010/main" val="832982928"/>
+        <p14:creationId xmlns:p14="http://schemas.microsoft.com/office/powerpoint/2010/main" val="3991755710"/>
       </p:ext>
     </p:extLst>
   </p:cSld>
@@ -756,13 +672,7 @@
       </p:grpSpPr>
       <p:sp>
         <p:nvSpPr>
-          <p:cNvPr id="2" name="Title 1">
-            <a:extLst>
-              <a:ext uri="{FF2B5EF4-FFF2-40B4-BE49-F238E27FC236}">
-                <a16:creationId xmlns:a16="http://schemas.microsoft.com/office/drawing/2014/main" id="{10DCF55C-C4B5-C395-9B41-5C813377DE24}"/>
-              </a:ext>
-            </a:extLst>
-          </p:cNvPr>
+          <p:cNvPr id="2" name="Title 1"/>
           <p:cNvSpPr>
             <a:spLocks noGrp="1"/>
           </p:cNvSpPr>
@@ -779,18 +689,13 @@
               <a:rPr lang="en-US"/>
               <a:t>Click to edit Master title style</a:t>
             </a:r>
-          </a:p>
-        </p:txBody>
-      </p:sp>
-      <p:sp>
-        <p:nvSpPr>
-          <p:cNvPr id="3" name="Content Placeholder 2">
-            <a:extLst>
-              <a:ext uri="{FF2B5EF4-FFF2-40B4-BE49-F238E27FC236}">
-                <a16:creationId xmlns:a16="http://schemas.microsoft.com/office/drawing/2014/main" id="{03CF1ED5-A5AB-041B-526C-5405E067BB4D}"/>
-              </a:ext>
-            </a:extLst>
-          </p:cNvPr>
+            <a:endParaRPr lang="en-US" dirty="0"/>
+          </a:p>
+        </p:txBody>
+      </p:sp>
+      <p:sp>
+        <p:nvSpPr>
+          <p:cNvPr id="3" name="Content Placeholder 2"/>
           <p:cNvSpPr>
             <a:spLocks noGrp="1"/>
           </p:cNvSpPr>
@@ -836,18 +741,13 @@
               <a:rPr lang="en-US"/>
               <a:t>Fifth level</a:t>
             </a:r>
-          </a:p>
-        </p:txBody>
-      </p:sp>
-      <p:sp>
-        <p:nvSpPr>
-          <p:cNvPr id="4" name="Date Placeholder 3">
-            <a:extLst>
-              <a:ext uri="{FF2B5EF4-FFF2-40B4-BE49-F238E27FC236}">
-                <a16:creationId xmlns:a16="http://schemas.microsoft.com/office/drawing/2014/main" id="{95F5F73C-4313-438D-0E92-B2106145FFBD}"/>
-              </a:ext>
-            </a:extLst>
-          </p:cNvPr>
+            <a:endParaRPr lang="en-US" dirty="0"/>
+          </a:p>
+        </p:txBody>
+      </p:sp>
+      <p:sp>
+        <p:nvSpPr>
+          <p:cNvPr id="4" name="Date Placeholder 3"/>
           <p:cNvSpPr>
             <a:spLocks noGrp="1"/>
           </p:cNvSpPr>
@@ -870,13 +770,7 @@
       </p:sp>
       <p:sp>
         <p:nvSpPr>
-          <p:cNvPr id="5" name="Footer Placeholder 4">
-            <a:extLst>
-              <a:ext uri="{FF2B5EF4-FFF2-40B4-BE49-F238E27FC236}">
-                <a16:creationId xmlns:a16="http://schemas.microsoft.com/office/drawing/2014/main" id="{C4F97618-72E8-5478-982F-2776361D61A9}"/>
-              </a:ext>
-            </a:extLst>
-          </p:cNvPr>
+          <p:cNvPr id="5" name="Footer Placeholder 4"/>
           <p:cNvSpPr>
             <a:spLocks noGrp="1"/>
           </p:cNvSpPr>
@@ -895,13 +789,7 @@
       </p:sp>
       <p:sp>
         <p:nvSpPr>
-          <p:cNvPr id="6" name="Slide Number Placeholder 5">
-            <a:extLst>
-              <a:ext uri="{FF2B5EF4-FFF2-40B4-BE49-F238E27FC236}">
-                <a16:creationId xmlns:a16="http://schemas.microsoft.com/office/drawing/2014/main" id="{B5DC3981-C52B-B43D-295D-A427095A9571}"/>
-              </a:ext>
-            </a:extLst>
-          </p:cNvPr>
+          <p:cNvPr id="6" name="Slide Number Placeholder 5"/>
           <p:cNvSpPr>
             <a:spLocks noGrp="1"/>
           </p:cNvSpPr>
@@ -925,7 +813,7 @@
     </p:spTree>
     <p:extLst>
       <p:ext uri="{BB962C8B-B14F-4D97-AF65-F5344CB8AC3E}">
-        <p14:creationId xmlns:p14="http://schemas.microsoft.com/office/powerpoint/2010/main" val="379431085"/>
+        <p14:creationId xmlns:p14="http://schemas.microsoft.com/office/powerpoint/2010/main" val="252600888"/>
       </p:ext>
     </p:extLst>
   </p:cSld>
@@ -954,13 +842,7 @@
       </p:grpSpPr>
       <p:sp>
         <p:nvSpPr>
-          <p:cNvPr id="2" name="Title 1">
-            <a:extLst>
-              <a:ext uri="{FF2B5EF4-FFF2-40B4-BE49-F238E27FC236}">
-                <a16:creationId xmlns:a16="http://schemas.microsoft.com/office/drawing/2014/main" id="{BCCB9EAA-3F1C-8CAA-B5A4-A98AC7D6977A}"/>
-              </a:ext>
-            </a:extLst>
-          </p:cNvPr>
+          <p:cNvPr id="2" name="Title 1"/>
           <p:cNvSpPr>
             <a:spLocks noGrp="1"/>
           </p:cNvSpPr>
@@ -986,18 +868,13 @@
               <a:rPr lang="en-US"/>
               <a:t>Click to edit Master title style</a:t>
             </a:r>
-          </a:p>
-        </p:txBody>
-      </p:sp>
-      <p:sp>
-        <p:nvSpPr>
-          <p:cNvPr id="3" name="Text Placeholder 2">
-            <a:extLst>
-              <a:ext uri="{FF2B5EF4-FFF2-40B4-BE49-F238E27FC236}">
-                <a16:creationId xmlns:a16="http://schemas.microsoft.com/office/drawing/2014/main" id="{F176EE0A-08D0-D71C-7086-3B55E46E7DA8}"/>
-              </a:ext>
-            </a:extLst>
-          </p:cNvPr>
+            <a:endParaRPr lang="en-US" dirty="0"/>
+          </a:p>
+        </p:txBody>
+      </p:sp>
+      <p:sp>
+        <p:nvSpPr>
+          <p:cNvPr id="3" name="Text Placeholder 2"/>
           <p:cNvSpPr>
             <a:spLocks noGrp="1"/>
           </p:cNvSpPr>
@@ -1116,13 +993,7 @@
       </p:sp>
       <p:sp>
         <p:nvSpPr>
-          <p:cNvPr id="4" name="Date Placeholder 3">
-            <a:extLst>
-              <a:ext uri="{FF2B5EF4-FFF2-40B4-BE49-F238E27FC236}">
-                <a16:creationId xmlns:a16="http://schemas.microsoft.com/office/drawing/2014/main" id="{1CFDC90A-B6E3-D09F-3C18-397FE67E96AB}"/>
-              </a:ext>
-            </a:extLst>
-          </p:cNvPr>
+          <p:cNvPr id="4" name="Date Placeholder 3"/>
           <p:cNvSpPr>
             <a:spLocks noGrp="1"/>
           </p:cNvSpPr>
@@ -1145,13 +1016,7 @@
       </p:sp>
       <p:sp>
         <p:nvSpPr>
-          <p:cNvPr id="5" name="Footer Placeholder 4">
-            <a:extLst>
-              <a:ext uri="{FF2B5EF4-FFF2-40B4-BE49-F238E27FC236}">
-                <a16:creationId xmlns:a16="http://schemas.microsoft.com/office/drawing/2014/main" id="{D6BF8E48-E69D-8C58-A129-61FE796967C3}"/>
-              </a:ext>
-            </a:extLst>
-          </p:cNvPr>
+          <p:cNvPr id="5" name="Footer Placeholder 4"/>
           <p:cNvSpPr>
             <a:spLocks noGrp="1"/>
           </p:cNvSpPr>
@@ -1170,13 +1035,7 @@
       </p:sp>
       <p:sp>
         <p:nvSpPr>
-          <p:cNvPr id="6" name="Slide Number Placeholder 5">
-            <a:extLst>
-              <a:ext uri="{FF2B5EF4-FFF2-40B4-BE49-F238E27FC236}">
-                <a16:creationId xmlns:a16="http://schemas.microsoft.com/office/drawing/2014/main" id="{DDFFFD70-EC37-C52B-C11C-8A72C07E27D9}"/>
-              </a:ext>
-            </a:extLst>
-          </p:cNvPr>
+          <p:cNvPr id="6" name="Slide Number Placeholder 5"/>
           <p:cNvSpPr>
             <a:spLocks noGrp="1"/>
           </p:cNvSpPr>
@@ -1200,7 +1059,7 @@
     </p:spTree>
     <p:extLst>
       <p:ext uri="{BB962C8B-B14F-4D97-AF65-F5344CB8AC3E}">
-        <p14:creationId xmlns:p14="http://schemas.microsoft.com/office/powerpoint/2010/main" val="461557485"/>
+        <p14:creationId xmlns:p14="http://schemas.microsoft.com/office/powerpoint/2010/main" val="4025760896"/>
       </p:ext>
     </p:extLst>
   </p:cSld>
@@ -1229,13 +1088,7 @@
       </p:grpSpPr>
       <p:sp>
         <p:nvSpPr>
-          <p:cNvPr id="2" name="Title 1">
-            <a:extLst>
-              <a:ext uri="{FF2B5EF4-FFF2-40B4-BE49-F238E27FC236}">
-                <a16:creationId xmlns:a16="http://schemas.microsoft.com/office/drawing/2014/main" id="{455580F2-F4CE-0DD5-311E-2E0E4F6854A9}"/>
-              </a:ext>
-            </a:extLst>
-          </p:cNvPr>
+          <p:cNvPr id="2" name="Title 1"/>
           <p:cNvSpPr>
             <a:spLocks noGrp="1"/>
           </p:cNvSpPr>
@@ -1252,18 +1105,13 @@
               <a:rPr lang="en-US"/>
               <a:t>Click to edit Master title style</a:t>
             </a:r>
-          </a:p>
-        </p:txBody>
-      </p:sp>
-      <p:sp>
-        <p:nvSpPr>
-          <p:cNvPr id="3" name="Content Placeholder 2">
-            <a:extLst>
-              <a:ext uri="{FF2B5EF4-FFF2-40B4-BE49-F238E27FC236}">
-                <a16:creationId xmlns:a16="http://schemas.microsoft.com/office/drawing/2014/main" id="{C454B505-83E2-CA52-7B67-1D9E4E72B13B}"/>
-              </a:ext>
-            </a:extLst>
-          </p:cNvPr>
+            <a:endParaRPr lang="en-US" dirty="0"/>
+          </a:p>
+        </p:txBody>
+      </p:sp>
+      <p:sp>
+        <p:nvSpPr>
+          <p:cNvPr id="3" name="Content Placeholder 2"/>
           <p:cNvSpPr>
             <a:spLocks noGrp="1"/>
           </p:cNvSpPr>
@@ -1314,18 +1162,13 @@
               <a:rPr lang="en-US"/>
               <a:t>Fifth level</a:t>
             </a:r>
-          </a:p>
-        </p:txBody>
-      </p:sp>
-      <p:sp>
-        <p:nvSpPr>
-          <p:cNvPr id="4" name="Content Placeholder 3">
-            <a:extLst>
-              <a:ext uri="{FF2B5EF4-FFF2-40B4-BE49-F238E27FC236}">
-                <a16:creationId xmlns:a16="http://schemas.microsoft.com/office/drawing/2014/main" id="{285E8D4D-F7FD-77BE-B466-4D3245334735}"/>
-              </a:ext>
-            </a:extLst>
-          </p:cNvPr>
+            <a:endParaRPr lang="en-US" dirty="0"/>
+          </a:p>
+        </p:txBody>
+      </p:sp>
+      <p:sp>
+        <p:nvSpPr>
+          <p:cNvPr id="4" name="Content Placeholder 3"/>
           <p:cNvSpPr>
             <a:spLocks noGrp="1"/>
           </p:cNvSpPr>
@@ -1376,18 +1219,13 @@
               <a:rPr lang="en-US"/>
               <a:t>Fifth level</a:t>
             </a:r>
-          </a:p>
-        </p:txBody>
-      </p:sp>
-      <p:sp>
-        <p:nvSpPr>
-          <p:cNvPr id="5" name="Date Placeholder 4">
-            <a:extLst>
-              <a:ext uri="{FF2B5EF4-FFF2-40B4-BE49-F238E27FC236}">
-                <a16:creationId xmlns:a16="http://schemas.microsoft.com/office/drawing/2014/main" id="{E0CDF72E-BB22-BF87-9D23-EF21D898C82A}"/>
-              </a:ext>
-            </a:extLst>
-          </p:cNvPr>
+            <a:endParaRPr lang="en-US" dirty="0"/>
+          </a:p>
+        </p:txBody>
+      </p:sp>
+      <p:sp>
+        <p:nvSpPr>
+          <p:cNvPr id="5" name="Date Placeholder 4"/>
           <p:cNvSpPr>
             <a:spLocks noGrp="1"/>
           </p:cNvSpPr>
@@ -1410,13 +1248,7 @@
       </p:sp>
       <p:sp>
         <p:nvSpPr>
-          <p:cNvPr id="6" name="Footer Placeholder 5">
-            <a:extLst>
-              <a:ext uri="{FF2B5EF4-FFF2-40B4-BE49-F238E27FC236}">
-                <a16:creationId xmlns:a16="http://schemas.microsoft.com/office/drawing/2014/main" id="{CF6996A5-67B8-1CD4-2E5A-32A596059235}"/>
-              </a:ext>
-            </a:extLst>
-          </p:cNvPr>
+          <p:cNvPr id="6" name="Footer Placeholder 5"/>
           <p:cNvSpPr>
             <a:spLocks noGrp="1"/>
           </p:cNvSpPr>
@@ -1435,13 +1267,7 @@
       </p:sp>
       <p:sp>
         <p:nvSpPr>
-          <p:cNvPr id="7" name="Slide Number Placeholder 6">
-            <a:extLst>
-              <a:ext uri="{FF2B5EF4-FFF2-40B4-BE49-F238E27FC236}">
-                <a16:creationId xmlns:a16="http://schemas.microsoft.com/office/drawing/2014/main" id="{5C2EBEF0-C676-9EEC-67EB-F1E96B330E82}"/>
-              </a:ext>
-            </a:extLst>
-          </p:cNvPr>
+          <p:cNvPr id="7" name="Slide Number Placeholder 6"/>
           <p:cNvSpPr>
             <a:spLocks noGrp="1"/>
           </p:cNvSpPr>
@@ -1465,7 +1291,7 @@
     </p:spTree>
     <p:extLst>
       <p:ext uri="{BB962C8B-B14F-4D97-AF65-F5344CB8AC3E}">
-        <p14:creationId xmlns:p14="http://schemas.microsoft.com/office/powerpoint/2010/main" val="1846376684"/>
+        <p14:creationId xmlns:p14="http://schemas.microsoft.com/office/powerpoint/2010/main" val="2102956330"/>
       </p:ext>
     </p:extLst>
   </p:cSld>
@@ -1494,13 +1320,7 @@
       </p:grpSpPr>
       <p:sp>
         <p:nvSpPr>
-          <p:cNvPr id="2" name="Title 1">
-            <a:extLst>
-              <a:ext uri="{FF2B5EF4-FFF2-40B4-BE49-F238E27FC236}">
-                <a16:creationId xmlns:a16="http://schemas.microsoft.com/office/drawing/2014/main" id="{D8F3692A-A060-CC05-1F40-CA6A5B4744A7}"/>
-              </a:ext>
-            </a:extLst>
-          </p:cNvPr>
+          <p:cNvPr id="2" name="Title 1"/>
           <p:cNvSpPr>
             <a:spLocks noGrp="1"/>
           </p:cNvSpPr>
@@ -1522,18 +1342,13 @@
               <a:rPr lang="en-US"/>
               <a:t>Click to edit Master title style</a:t>
             </a:r>
-          </a:p>
-        </p:txBody>
-      </p:sp>
-      <p:sp>
-        <p:nvSpPr>
-          <p:cNvPr id="3" name="Text Placeholder 2">
-            <a:extLst>
-              <a:ext uri="{FF2B5EF4-FFF2-40B4-BE49-F238E27FC236}">
-                <a16:creationId xmlns:a16="http://schemas.microsoft.com/office/drawing/2014/main" id="{73B9F228-73CF-AE30-C92C-EC5EAB0662C5}"/>
-              </a:ext>
-            </a:extLst>
-          </p:cNvPr>
+            <a:endParaRPr lang="en-US" dirty="0"/>
+          </a:p>
+        </p:txBody>
+      </p:sp>
+      <p:sp>
+        <p:nvSpPr>
+          <p:cNvPr id="3" name="Text Placeholder 2"/>
           <p:cNvSpPr>
             <a:spLocks noGrp="1"/>
           </p:cNvSpPr>
@@ -1598,13 +1413,7 @@
       </p:sp>
       <p:sp>
         <p:nvSpPr>
-          <p:cNvPr id="4" name="Content Placeholder 3">
-            <a:extLst>
-              <a:ext uri="{FF2B5EF4-FFF2-40B4-BE49-F238E27FC236}">
-                <a16:creationId xmlns:a16="http://schemas.microsoft.com/office/drawing/2014/main" id="{C334E8B0-E51D-7E44-3942-5C4B495EEDB1}"/>
-              </a:ext>
-            </a:extLst>
-          </p:cNvPr>
+          <p:cNvPr id="4" name="Content Placeholder 3"/>
           <p:cNvSpPr>
             <a:spLocks noGrp="1"/>
           </p:cNvSpPr>
@@ -1655,18 +1464,13 @@
               <a:rPr lang="en-US"/>
               <a:t>Fifth level</a:t>
             </a:r>
-          </a:p>
-        </p:txBody>
-      </p:sp>
-      <p:sp>
-        <p:nvSpPr>
-          <p:cNvPr id="5" name="Text Placeholder 4">
-            <a:extLst>
-              <a:ext uri="{FF2B5EF4-FFF2-40B4-BE49-F238E27FC236}">
-                <a16:creationId xmlns:a16="http://schemas.microsoft.com/office/drawing/2014/main" id="{3FC30CEF-EC26-BD1F-1A73-AE9EA8AD4FED}"/>
-              </a:ext>
-            </a:extLst>
-          </p:cNvPr>
+            <a:endParaRPr lang="en-US" dirty="0"/>
+          </a:p>
+        </p:txBody>
+      </p:sp>
+      <p:sp>
+        <p:nvSpPr>
+          <p:cNvPr id="5" name="Text Placeholder 4"/>
           <p:cNvSpPr>
             <a:spLocks noGrp="1"/>
           </p:cNvSpPr>
@@ -1731,13 +1535,7 @@
       </p:sp>
       <p:sp>
         <p:nvSpPr>
-          <p:cNvPr id="6" name="Content Placeholder 5">
-            <a:extLst>
-              <a:ext uri="{FF2B5EF4-FFF2-40B4-BE49-F238E27FC236}">
-                <a16:creationId xmlns:a16="http://schemas.microsoft.com/office/drawing/2014/main" id="{28692912-9625-FFB7-276B-D6B455FF6CE7}"/>
-              </a:ext>
-            </a:extLst>
-          </p:cNvPr>
+          <p:cNvPr id="6" name="Content Placeholder 5"/>
           <p:cNvSpPr>
             <a:spLocks noGrp="1"/>
           </p:cNvSpPr>
@@ -1788,18 +1586,13 @@
               <a:rPr lang="en-US"/>
               <a:t>Fifth level</a:t>
             </a:r>
-          </a:p>
-        </p:txBody>
-      </p:sp>
-      <p:sp>
-        <p:nvSpPr>
-          <p:cNvPr id="7" name="Date Placeholder 6">
-            <a:extLst>
-              <a:ext uri="{FF2B5EF4-FFF2-40B4-BE49-F238E27FC236}">
-                <a16:creationId xmlns:a16="http://schemas.microsoft.com/office/drawing/2014/main" id="{3BC3CA97-7DAA-72D6-989C-79AF07717868}"/>
-              </a:ext>
-            </a:extLst>
-          </p:cNvPr>
+            <a:endParaRPr lang="en-US" dirty="0"/>
+          </a:p>
+        </p:txBody>
+      </p:sp>
+      <p:sp>
+        <p:nvSpPr>
+          <p:cNvPr id="7" name="Date Placeholder 6"/>
           <p:cNvSpPr>
             <a:spLocks noGrp="1"/>
           </p:cNvSpPr>
@@ -1822,13 +1615,7 @@
       </p:sp>
       <p:sp>
         <p:nvSpPr>
-          <p:cNvPr id="8" name="Footer Placeholder 7">
-            <a:extLst>
-              <a:ext uri="{FF2B5EF4-FFF2-40B4-BE49-F238E27FC236}">
-                <a16:creationId xmlns:a16="http://schemas.microsoft.com/office/drawing/2014/main" id="{3C77D2C0-8BDE-A158-7E01-0C52401F9CD8}"/>
-              </a:ext>
-            </a:extLst>
-          </p:cNvPr>
+          <p:cNvPr id="8" name="Footer Placeholder 7"/>
           <p:cNvSpPr>
             <a:spLocks noGrp="1"/>
           </p:cNvSpPr>
@@ -1847,13 +1634,7 @@
       </p:sp>
       <p:sp>
         <p:nvSpPr>
-          <p:cNvPr id="9" name="Slide Number Placeholder 8">
-            <a:extLst>
-              <a:ext uri="{FF2B5EF4-FFF2-40B4-BE49-F238E27FC236}">
-                <a16:creationId xmlns:a16="http://schemas.microsoft.com/office/drawing/2014/main" id="{2D9BCAC4-3B65-54F6-D0BD-D3551EA6BE55}"/>
-              </a:ext>
-            </a:extLst>
-          </p:cNvPr>
+          <p:cNvPr id="9" name="Slide Number Placeholder 8"/>
           <p:cNvSpPr>
             <a:spLocks noGrp="1"/>
           </p:cNvSpPr>
@@ -1877,7 +1658,7 @@
     </p:spTree>
     <p:extLst>
       <p:ext uri="{BB962C8B-B14F-4D97-AF65-F5344CB8AC3E}">
-        <p14:creationId xmlns:p14="http://schemas.microsoft.com/office/powerpoint/2010/main" val="1785862064"/>
+        <p14:creationId xmlns:p14="http://schemas.microsoft.com/office/powerpoint/2010/main" val="494117654"/>
       </p:ext>
     </p:extLst>
   </p:cSld>
@@ -1906,13 +1687,7 @@
       </p:grpSpPr>
       <p:sp>
         <p:nvSpPr>
-          <p:cNvPr id="2" name="Title 1">
-            <a:extLst>
-              <a:ext uri="{FF2B5EF4-FFF2-40B4-BE49-F238E27FC236}">
-                <a16:creationId xmlns:a16="http://schemas.microsoft.com/office/drawing/2014/main" id="{FD22BA90-4663-B37B-A257-731B12E95272}"/>
-              </a:ext>
-            </a:extLst>
-          </p:cNvPr>
+          <p:cNvPr id="2" name="Title 1"/>
           <p:cNvSpPr>
             <a:spLocks noGrp="1"/>
           </p:cNvSpPr>
@@ -1929,18 +1704,13 @@
               <a:rPr lang="en-US"/>
               <a:t>Click to edit Master title style</a:t>
             </a:r>
-          </a:p>
-        </p:txBody>
-      </p:sp>
-      <p:sp>
-        <p:nvSpPr>
-          <p:cNvPr id="3" name="Date Placeholder 2">
-            <a:extLst>
-              <a:ext uri="{FF2B5EF4-FFF2-40B4-BE49-F238E27FC236}">
-                <a16:creationId xmlns:a16="http://schemas.microsoft.com/office/drawing/2014/main" id="{D5F0F772-82F5-1792-CE33-A1C131F3478D}"/>
-              </a:ext>
-            </a:extLst>
-          </p:cNvPr>
+            <a:endParaRPr lang="en-US" dirty="0"/>
+          </a:p>
+        </p:txBody>
+      </p:sp>
+      <p:sp>
+        <p:nvSpPr>
+          <p:cNvPr id="3" name="Date Placeholder 2"/>
           <p:cNvSpPr>
             <a:spLocks noGrp="1"/>
           </p:cNvSpPr>
@@ -1963,13 +1733,7 @@
       </p:sp>
       <p:sp>
         <p:nvSpPr>
-          <p:cNvPr id="4" name="Footer Placeholder 3">
-            <a:extLst>
-              <a:ext uri="{FF2B5EF4-FFF2-40B4-BE49-F238E27FC236}">
-                <a16:creationId xmlns:a16="http://schemas.microsoft.com/office/drawing/2014/main" id="{B301B5AB-BF96-1CBB-0444-71A08020DDF8}"/>
-              </a:ext>
-            </a:extLst>
-          </p:cNvPr>
+          <p:cNvPr id="4" name="Footer Placeholder 3"/>
           <p:cNvSpPr>
             <a:spLocks noGrp="1"/>
           </p:cNvSpPr>
@@ -1988,13 +1752,7 @@
       </p:sp>
       <p:sp>
         <p:nvSpPr>
-          <p:cNvPr id="5" name="Slide Number Placeholder 4">
-            <a:extLst>
-              <a:ext uri="{FF2B5EF4-FFF2-40B4-BE49-F238E27FC236}">
-                <a16:creationId xmlns:a16="http://schemas.microsoft.com/office/drawing/2014/main" id="{449C850A-2369-A912-363D-659A28E9D337}"/>
-              </a:ext>
-            </a:extLst>
-          </p:cNvPr>
+          <p:cNvPr id="5" name="Slide Number Placeholder 4"/>
           <p:cNvSpPr>
             <a:spLocks noGrp="1"/>
           </p:cNvSpPr>
@@ -2018,7 +1776,7 @@
     </p:spTree>
     <p:extLst>
       <p:ext uri="{BB962C8B-B14F-4D97-AF65-F5344CB8AC3E}">
-        <p14:creationId xmlns:p14="http://schemas.microsoft.com/office/powerpoint/2010/main" val="388769954"/>
+        <p14:creationId xmlns:p14="http://schemas.microsoft.com/office/powerpoint/2010/main" val="478165596"/>
       </p:ext>
     </p:extLst>
   </p:cSld>
@@ -2047,13 +1805,7 @@
       </p:grpSpPr>
       <p:sp>
         <p:nvSpPr>
-          <p:cNvPr id="2" name="Date Placeholder 1">
-            <a:extLst>
-              <a:ext uri="{FF2B5EF4-FFF2-40B4-BE49-F238E27FC236}">
-                <a16:creationId xmlns:a16="http://schemas.microsoft.com/office/drawing/2014/main" id="{959F0ECD-128B-A9B4-AFCC-DF5C178068E8}"/>
-              </a:ext>
-            </a:extLst>
-          </p:cNvPr>
+          <p:cNvPr id="2" name="Date Placeholder 1"/>
           <p:cNvSpPr>
             <a:spLocks noGrp="1"/>
           </p:cNvSpPr>
@@ -2076,13 +1828,7 @@
       </p:sp>
       <p:sp>
         <p:nvSpPr>
-          <p:cNvPr id="3" name="Footer Placeholder 2">
-            <a:extLst>
-              <a:ext uri="{FF2B5EF4-FFF2-40B4-BE49-F238E27FC236}">
-                <a16:creationId xmlns:a16="http://schemas.microsoft.com/office/drawing/2014/main" id="{F2F6F875-9EDC-D747-AECD-4BB5473AED0F}"/>
-              </a:ext>
-            </a:extLst>
-          </p:cNvPr>
+          <p:cNvPr id="3" name="Footer Placeholder 2"/>
           <p:cNvSpPr>
             <a:spLocks noGrp="1"/>
           </p:cNvSpPr>
@@ -2101,13 +1847,7 @@
       </p:sp>
       <p:sp>
         <p:nvSpPr>
-          <p:cNvPr id="4" name="Slide Number Placeholder 3">
-            <a:extLst>
-              <a:ext uri="{FF2B5EF4-FFF2-40B4-BE49-F238E27FC236}">
-                <a16:creationId xmlns:a16="http://schemas.microsoft.com/office/drawing/2014/main" id="{6CABAF09-750C-C4D8-9FCD-D07141F40FC8}"/>
-              </a:ext>
-            </a:extLst>
-          </p:cNvPr>
+          <p:cNvPr id="4" name="Slide Number Placeholder 3"/>
           <p:cNvSpPr>
             <a:spLocks noGrp="1"/>
           </p:cNvSpPr>
@@ -2131,7 +1871,7 @@
     </p:spTree>
     <p:extLst>
       <p:ext uri="{BB962C8B-B14F-4D97-AF65-F5344CB8AC3E}">
-        <p14:creationId xmlns:p14="http://schemas.microsoft.com/office/powerpoint/2010/main" val="1487180658"/>
+        <p14:creationId xmlns:p14="http://schemas.microsoft.com/office/powerpoint/2010/main" val="3480901001"/>
       </p:ext>
     </p:extLst>
   </p:cSld>
@@ -2160,13 +1900,7 @@
       </p:grpSpPr>
       <p:sp>
         <p:nvSpPr>
-          <p:cNvPr id="2" name="Title 1">
-            <a:extLst>
-              <a:ext uri="{FF2B5EF4-FFF2-40B4-BE49-F238E27FC236}">
-                <a16:creationId xmlns:a16="http://schemas.microsoft.com/office/drawing/2014/main" id="{AD3A1BB2-B006-78FF-81C2-EAD953B68A08}"/>
-              </a:ext>
-            </a:extLst>
-          </p:cNvPr>
+          <p:cNvPr id="2" name="Title 1"/>
           <p:cNvSpPr>
             <a:spLocks noGrp="1"/>
           </p:cNvSpPr>
@@ -2192,18 +1926,13 @@
               <a:rPr lang="en-US"/>
               <a:t>Click to edit Master title style</a:t>
             </a:r>
-          </a:p>
-        </p:txBody>
-      </p:sp>
-      <p:sp>
-        <p:nvSpPr>
-          <p:cNvPr id="3" name="Content Placeholder 2">
-            <a:extLst>
-              <a:ext uri="{FF2B5EF4-FFF2-40B4-BE49-F238E27FC236}">
-                <a16:creationId xmlns:a16="http://schemas.microsoft.com/office/drawing/2014/main" id="{90D72F3C-4579-5FB3-C198-34820AF539B6}"/>
-              </a:ext>
-            </a:extLst>
-          </p:cNvPr>
+            <a:endParaRPr lang="en-US" dirty="0"/>
+          </a:p>
+        </p:txBody>
+      </p:sp>
+      <p:sp>
+        <p:nvSpPr>
+          <p:cNvPr id="3" name="Content Placeholder 2"/>
           <p:cNvSpPr>
             <a:spLocks noGrp="1"/>
           </p:cNvSpPr>
@@ -2282,18 +2011,13 @@
               <a:rPr lang="en-US"/>
               <a:t>Fifth level</a:t>
             </a:r>
-          </a:p>
-        </p:txBody>
-      </p:sp>
-      <p:sp>
-        <p:nvSpPr>
-          <p:cNvPr id="4" name="Text Placeholder 3">
-            <a:extLst>
-              <a:ext uri="{FF2B5EF4-FFF2-40B4-BE49-F238E27FC236}">
-                <a16:creationId xmlns:a16="http://schemas.microsoft.com/office/drawing/2014/main" id="{7C5D1466-12D0-FCC2-9DCF-C1661072249E}"/>
-              </a:ext>
-            </a:extLst>
-          </p:cNvPr>
+            <a:endParaRPr lang="en-US" dirty="0"/>
+          </a:p>
+        </p:txBody>
+      </p:sp>
+      <p:sp>
+        <p:nvSpPr>
+          <p:cNvPr id="4" name="Text Placeholder 3"/>
           <p:cNvSpPr>
             <a:spLocks noGrp="1"/>
           </p:cNvSpPr>
@@ -2358,13 +2082,7 @@
       </p:sp>
       <p:sp>
         <p:nvSpPr>
-          <p:cNvPr id="5" name="Date Placeholder 4">
-            <a:extLst>
-              <a:ext uri="{FF2B5EF4-FFF2-40B4-BE49-F238E27FC236}">
-                <a16:creationId xmlns:a16="http://schemas.microsoft.com/office/drawing/2014/main" id="{17034F26-87E8-FB5E-1D73-1B8CAECFD9A2}"/>
-              </a:ext>
-            </a:extLst>
-          </p:cNvPr>
+          <p:cNvPr id="5" name="Date Placeholder 4"/>
           <p:cNvSpPr>
             <a:spLocks noGrp="1"/>
           </p:cNvSpPr>
@@ -2387,13 +2105,7 @@
       </p:sp>
       <p:sp>
         <p:nvSpPr>
-          <p:cNvPr id="6" name="Footer Placeholder 5">
-            <a:extLst>
-              <a:ext uri="{FF2B5EF4-FFF2-40B4-BE49-F238E27FC236}">
-                <a16:creationId xmlns:a16="http://schemas.microsoft.com/office/drawing/2014/main" id="{7D645444-5897-CE5D-0CA5-F1A1F0D881BC}"/>
-              </a:ext>
-            </a:extLst>
-          </p:cNvPr>
+          <p:cNvPr id="6" name="Footer Placeholder 5"/>
           <p:cNvSpPr>
             <a:spLocks noGrp="1"/>
           </p:cNvSpPr>
@@ -2412,13 +2124,7 @@
       </p:sp>
       <p:sp>
         <p:nvSpPr>
-          <p:cNvPr id="7" name="Slide Number Placeholder 6">
-            <a:extLst>
-              <a:ext uri="{FF2B5EF4-FFF2-40B4-BE49-F238E27FC236}">
-                <a16:creationId xmlns:a16="http://schemas.microsoft.com/office/drawing/2014/main" id="{C68056DC-C433-7CAC-7C44-9ABAEF5352CE}"/>
-              </a:ext>
-            </a:extLst>
-          </p:cNvPr>
+          <p:cNvPr id="7" name="Slide Number Placeholder 6"/>
           <p:cNvSpPr>
             <a:spLocks noGrp="1"/>
           </p:cNvSpPr>
@@ -2442,7 +2148,7 @@
     </p:spTree>
     <p:extLst>
       <p:ext uri="{BB962C8B-B14F-4D97-AF65-F5344CB8AC3E}">
-        <p14:creationId xmlns:p14="http://schemas.microsoft.com/office/powerpoint/2010/main" val="721578045"/>
+        <p14:creationId xmlns:p14="http://schemas.microsoft.com/office/powerpoint/2010/main" val="302151194"/>
       </p:ext>
     </p:extLst>
   </p:cSld>
@@ -2471,13 +2177,7 @@
       </p:grpSpPr>
       <p:sp>
         <p:nvSpPr>
-          <p:cNvPr id="2" name="Title 1">
-            <a:extLst>
-              <a:ext uri="{FF2B5EF4-FFF2-40B4-BE49-F238E27FC236}">
-                <a16:creationId xmlns:a16="http://schemas.microsoft.com/office/drawing/2014/main" id="{B53CB723-FD7E-4FBE-7AF2-0BD978ED63C7}"/>
-              </a:ext>
-            </a:extLst>
-          </p:cNvPr>
+          <p:cNvPr id="2" name="Title 1"/>
           <p:cNvSpPr>
             <a:spLocks noGrp="1"/>
           </p:cNvSpPr>
@@ -2503,20 +2203,15 @@
               <a:rPr lang="en-US"/>
               <a:t>Click to edit Master title style</a:t>
             </a:r>
-          </a:p>
-        </p:txBody>
-      </p:sp>
-      <p:sp>
-        <p:nvSpPr>
-          <p:cNvPr id="3" name="Picture Placeholder 2">
-            <a:extLst>
-              <a:ext uri="{FF2B5EF4-FFF2-40B4-BE49-F238E27FC236}">
-                <a16:creationId xmlns:a16="http://schemas.microsoft.com/office/drawing/2014/main" id="{3E536CF4-09A7-6881-E2B3-C03126F720FB}"/>
-              </a:ext>
-            </a:extLst>
-          </p:cNvPr>
-          <p:cNvSpPr>
-            <a:spLocks noGrp="1"/>
+            <a:endParaRPr lang="en-US" dirty="0"/>
+          </a:p>
+        </p:txBody>
+      </p:sp>
+      <p:sp>
+        <p:nvSpPr>
+          <p:cNvPr id="3" name="Picture Placeholder 2"/>
+          <p:cNvSpPr>
+            <a:spLocks noGrp="1" noChangeAspect="1"/>
           </p:cNvSpPr>
           <p:nvPr>
             <p:ph type="pic" idx="1"/>
@@ -2529,7 +2224,7 @@
           </a:xfrm>
         </p:spPr>
         <p:txBody>
-          <a:bodyPr/>
+          <a:bodyPr anchor="t"/>
           <a:lstStyle>
             <a:lvl1pPr marL="0" indent="0">
               <a:buNone/>
@@ -2569,19 +2264,17 @@
             </a:lvl9pPr>
           </a:lstStyle>
           <a:p>
-            <a:endParaRPr lang="en-US"/>
-          </a:p>
-        </p:txBody>
-      </p:sp>
-      <p:sp>
-        <p:nvSpPr>
-          <p:cNvPr id="4" name="Text Placeholder 3">
-            <a:extLst>
-              <a:ext uri="{FF2B5EF4-FFF2-40B4-BE49-F238E27FC236}">
-                <a16:creationId xmlns:a16="http://schemas.microsoft.com/office/drawing/2014/main" id="{0E2E721F-31EC-1A5B-6A82-EBC0B423A83D}"/>
-              </a:ext>
-            </a:extLst>
-          </p:cNvPr>
+            <a:r>
+              <a:rPr lang="en-US"/>
+              <a:t>Click icon to add picture</a:t>
+            </a:r>
+            <a:endParaRPr lang="en-US" dirty="0"/>
+          </a:p>
+        </p:txBody>
+      </p:sp>
+      <p:sp>
+        <p:nvSpPr>
+          <p:cNvPr id="4" name="Text Placeholder 3"/>
           <p:cNvSpPr>
             <a:spLocks noGrp="1"/>
           </p:cNvSpPr>
@@ -2646,13 +2339,7 @@
       </p:sp>
       <p:sp>
         <p:nvSpPr>
-          <p:cNvPr id="5" name="Date Placeholder 4">
-            <a:extLst>
-              <a:ext uri="{FF2B5EF4-FFF2-40B4-BE49-F238E27FC236}">
-                <a16:creationId xmlns:a16="http://schemas.microsoft.com/office/drawing/2014/main" id="{4FA16EA1-E796-059C-8D0F-B8ED7D8BB9FE}"/>
-              </a:ext>
-            </a:extLst>
-          </p:cNvPr>
+          <p:cNvPr id="5" name="Date Placeholder 4"/>
           <p:cNvSpPr>
             <a:spLocks noGrp="1"/>
           </p:cNvSpPr>
@@ -2675,13 +2362,7 @@
       </p:sp>
       <p:sp>
         <p:nvSpPr>
-          <p:cNvPr id="6" name="Footer Placeholder 5">
-            <a:extLst>
-              <a:ext uri="{FF2B5EF4-FFF2-40B4-BE49-F238E27FC236}">
-                <a16:creationId xmlns:a16="http://schemas.microsoft.com/office/drawing/2014/main" id="{139D18C1-1B03-F24E-1795-4BB95F935072}"/>
-              </a:ext>
-            </a:extLst>
-          </p:cNvPr>
+          <p:cNvPr id="6" name="Footer Placeholder 5"/>
           <p:cNvSpPr>
             <a:spLocks noGrp="1"/>
           </p:cNvSpPr>
@@ -2700,13 +2381,7 @@
       </p:sp>
       <p:sp>
         <p:nvSpPr>
-          <p:cNvPr id="7" name="Slide Number Placeholder 6">
-            <a:extLst>
-              <a:ext uri="{FF2B5EF4-FFF2-40B4-BE49-F238E27FC236}">
-                <a16:creationId xmlns:a16="http://schemas.microsoft.com/office/drawing/2014/main" id="{D3547F20-20E6-4219-92EB-1E99D8645A24}"/>
-              </a:ext>
-            </a:extLst>
-          </p:cNvPr>
+          <p:cNvPr id="7" name="Slide Number Placeholder 6"/>
           <p:cNvSpPr>
             <a:spLocks noGrp="1"/>
           </p:cNvSpPr>
@@ -2730,7 +2405,7 @@
     </p:spTree>
     <p:extLst>
       <p:ext uri="{BB962C8B-B14F-4D97-AF65-F5344CB8AC3E}">
-        <p14:creationId xmlns:p14="http://schemas.microsoft.com/office/powerpoint/2010/main" val="718960085"/>
+        <p14:creationId xmlns:p14="http://schemas.microsoft.com/office/powerpoint/2010/main" val="4140060408"/>
       </p:ext>
     </p:extLst>
   </p:cSld>
@@ -2745,7 +2420,7 @@
   <p:cSld>
     <p:bg>
       <p:bgRef idx="1001">
-        <a:schemeClr val="bg1"/>
+        <a:schemeClr val="bg2"/>
       </p:bgRef>
     </p:bg>
     <p:spTree>
@@ -2764,13 +2439,7 @@
       </p:grpSpPr>
       <p:sp>
         <p:nvSpPr>
-          <p:cNvPr id="2" name="Title Placeholder 1">
-            <a:extLst>
-              <a:ext uri="{FF2B5EF4-FFF2-40B4-BE49-F238E27FC236}">
-                <a16:creationId xmlns:a16="http://schemas.microsoft.com/office/drawing/2014/main" id="{6FB37C53-A186-CB06-881F-C22F7EFC1308}"/>
-              </a:ext>
-            </a:extLst>
-          </p:cNvPr>
+          <p:cNvPr id="2" name="Title Placeholder 1"/>
           <p:cNvSpPr>
             <a:spLocks noGrp="1"/>
           </p:cNvSpPr>
@@ -2797,18 +2466,13 @@
               <a:rPr lang="en-US"/>
               <a:t>Click to edit Master title style</a:t>
             </a:r>
-          </a:p>
-        </p:txBody>
-      </p:sp>
-      <p:sp>
-        <p:nvSpPr>
-          <p:cNvPr id="3" name="Text Placeholder 2">
-            <a:extLst>
-              <a:ext uri="{FF2B5EF4-FFF2-40B4-BE49-F238E27FC236}">
-                <a16:creationId xmlns:a16="http://schemas.microsoft.com/office/drawing/2014/main" id="{8D76805D-8436-471E-3E38-2D9BCCE7234B}"/>
-              </a:ext>
-            </a:extLst>
-          </p:cNvPr>
+            <a:endParaRPr lang="en-US" dirty="0"/>
+          </a:p>
+        </p:txBody>
+      </p:sp>
+      <p:sp>
+        <p:nvSpPr>
+          <p:cNvPr id="3" name="Text Placeholder 2"/>
           <p:cNvSpPr>
             <a:spLocks noGrp="1"/>
           </p:cNvSpPr>
@@ -2864,18 +2528,13 @@
               <a:rPr lang="en-US"/>
               <a:t>Fifth level</a:t>
             </a:r>
-          </a:p>
-        </p:txBody>
-      </p:sp>
-      <p:sp>
-        <p:nvSpPr>
-          <p:cNvPr id="4" name="Date Placeholder 3">
-            <a:extLst>
-              <a:ext uri="{FF2B5EF4-FFF2-40B4-BE49-F238E27FC236}">
-                <a16:creationId xmlns:a16="http://schemas.microsoft.com/office/drawing/2014/main" id="{4B74D5D3-EC77-8A65-3E9B-4378BF80CA14}"/>
-              </a:ext>
-            </a:extLst>
-          </p:cNvPr>
+            <a:endParaRPr lang="en-US" dirty="0"/>
+          </a:p>
+        </p:txBody>
+      </p:sp>
+      <p:sp>
+        <p:nvSpPr>
+          <p:cNvPr id="4" name="Date Placeholder 3"/>
           <p:cNvSpPr>
             <a:spLocks noGrp="1"/>
           </p:cNvSpPr>
@@ -2916,13 +2575,7 @@
       </p:sp>
       <p:sp>
         <p:nvSpPr>
-          <p:cNvPr id="5" name="Footer Placeholder 4">
-            <a:extLst>
-              <a:ext uri="{FF2B5EF4-FFF2-40B4-BE49-F238E27FC236}">
-                <a16:creationId xmlns:a16="http://schemas.microsoft.com/office/drawing/2014/main" id="{3F7AAD36-7125-04CB-89BD-EE203169F901}"/>
-              </a:ext>
-            </a:extLst>
-          </p:cNvPr>
+          <p:cNvPr id="5" name="Footer Placeholder 4"/>
           <p:cNvSpPr>
             <a:spLocks noGrp="1"/>
           </p:cNvSpPr>
@@ -2959,13 +2612,7 @@
       </p:sp>
       <p:sp>
         <p:nvSpPr>
-          <p:cNvPr id="6" name="Slide Number Placeholder 5">
-            <a:extLst>
-              <a:ext uri="{FF2B5EF4-FFF2-40B4-BE49-F238E27FC236}">
-                <a16:creationId xmlns:a16="http://schemas.microsoft.com/office/drawing/2014/main" id="{D41CF723-C6DB-CE74-89EC-1E0ADD970598}"/>
-              </a:ext>
-            </a:extLst>
-          </p:cNvPr>
+          <p:cNvPr id="6" name="Slide Number Placeholder 5"/>
           <p:cNvSpPr>
             <a:spLocks noGrp="1"/>
           </p:cNvSpPr>
@@ -3007,23 +2654,23 @@
     </p:spTree>
     <p:extLst>
       <p:ext uri="{BB962C8B-B14F-4D97-AF65-F5344CB8AC3E}">
-        <p14:creationId xmlns:p14="http://schemas.microsoft.com/office/powerpoint/2010/main" val="2292138654"/>
+        <p14:creationId xmlns:p14="http://schemas.microsoft.com/office/powerpoint/2010/main" val="2769896579"/>
       </p:ext>
     </p:extLst>
   </p:cSld>
   <p:clrMap bg1="lt1" tx1="dk1" bg2="lt2" tx2="dk2" accent1="accent1" accent2="accent2" accent3="accent3" accent4="accent4" accent5="accent5" accent6="accent6" hlink="hlink" folHlink="folHlink"/>
   <p:sldLayoutIdLst>
-    <p:sldLayoutId id="2147483649" r:id="rId1"/>
-    <p:sldLayoutId id="2147483650" r:id="rId2"/>
-    <p:sldLayoutId id="2147483651" r:id="rId3"/>
-    <p:sldLayoutId id="2147483652" r:id="rId4"/>
-    <p:sldLayoutId id="2147483653" r:id="rId5"/>
-    <p:sldLayoutId id="2147483654" r:id="rId6"/>
-    <p:sldLayoutId id="2147483655" r:id="rId7"/>
-    <p:sldLayoutId id="2147483656" r:id="rId8"/>
-    <p:sldLayoutId id="2147483657" r:id="rId9"/>
-    <p:sldLayoutId id="2147483658" r:id="rId10"/>
-    <p:sldLayoutId id="2147483659" r:id="rId11"/>
+    <p:sldLayoutId id="2147483673" r:id="rId1"/>
+    <p:sldLayoutId id="2147483674" r:id="rId2"/>
+    <p:sldLayoutId id="2147483675" r:id="rId3"/>
+    <p:sldLayoutId id="2147483676" r:id="rId4"/>
+    <p:sldLayoutId id="2147483677" r:id="rId5"/>
+    <p:sldLayoutId id="2147483678" r:id="rId6"/>
+    <p:sldLayoutId id="2147483679" r:id="rId7"/>
+    <p:sldLayoutId id="2147483680" r:id="rId8"/>
+    <p:sldLayoutId id="2147483681" r:id="rId9"/>
+    <p:sldLayoutId id="2147483682" r:id="rId10"/>
+    <p:sldLayoutId id="2147483683" r:id="rId11"/>
   </p:sldLayoutIdLst>
   <p:txStyles>
     <p:titleStyle>
@@ -3353,23 +3000,8 @@
                 </a:solidFill>
                 <a:latin typeface="Franklin Gothic Demi" panose="020B0703020102020204" pitchFamily="34" charset="0"/>
               </a:rPr>
-              <a:t>MidTerM </a:t>
-            </a:r>
-            <a:r>
-              <a:rPr lang="en-US" dirty="0" err="1">
-                <a:solidFill>
-                  <a:srgbClr val="00B050"/>
-                </a:solidFill>
-                <a:latin typeface="Franklin Gothic Demi" panose="020B0703020102020204" pitchFamily="34" charset="0"/>
-              </a:rPr>
-              <a:t>pROpOSaL</a:t>
-            </a:r>
-            <a:endParaRPr lang="en-US" dirty="0">
-              <a:solidFill>
-                <a:srgbClr val="00B050"/>
-              </a:solidFill>
-              <a:latin typeface="Franklin Gothic Demi" panose="020B0703020102020204" pitchFamily="34" charset="0"/>
-            </a:endParaRPr>
+              <a:t>MidTerM pROpOSaL</a:t>
+            </a:r>
           </a:p>
         </p:txBody>
       </p:sp>
@@ -4121,7 +3753,7 @@
 <file path=ppt/theme/theme1.xml><?xml version="1.0" encoding="utf-8"?>
 <a:theme xmlns:a="http://schemas.openxmlformats.org/drawingml/2006/main" name="Office Theme">
   <a:themeElements>
-    <a:clrScheme name="Office">
+    <a:clrScheme name="Office Theme">
       <a:dk1>
         <a:sysClr val="windowText" lastClr="000000"/>
       </a:dk1>
@@ -4135,22 +3767,22 @@
         <a:srgbClr val="E7E6E6"/>
       </a:lt2>
       <a:accent1>
-        <a:srgbClr val="4472C4"/>
+        <a:srgbClr val="1D9A78"/>
       </a:accent1>
       <a:accent2>
-        <a:srgbClr val="ED7D31"/>
+        <a:srgbClr val="8BC145"/>
       </a:accent2>
       <a:accent3>
-        <a:srgbClr val="A5A5A5"/>
+        <a:srgbClr val="36AFCE"/>
       </a:accent3>
       <a:accent4>
-        <a:srgbClr val="FFC000"/>
+        <a:srgbClr val="1D6FA9"/>
       </a:accent4>
       <a:accent5>
-        <a:srgbClr val="5B9BD5"/>
+        <a:srgbClr val="B74919"/>
       </a:accent5>
       <a:accent6>
-        <a:srgbClr val="70AD47"/>
+        <a:srgbClr val="F19D19"/>
       </a:accent6>
       <a:hlink>
         <a:srgbClr val="0563C1"/>
@@ -4159,7 +3791,7 @@
         <a:srgbClr val="954F72"/>
       </a:folHlink>
     </a:clrScheme>
-    <a:fontScheme name="Office">
+    <a:fontScheme name="Office Theme">
       <a:majorFont>
         <a:latin typeface="Calibri Light" panose="020F0302020204030204"/>
         <a:ea typeface=""/>
@@ -4194,23 +3826,6 @@
         <a:font script="Viet" typeface="Times New Roman"/>
         <a:font script="Uigh" typeface="Microsoft Uighur"/>
         <a:font script="Geor" typeface="Sylfaen"/>
-        <a:font script="Armn" typeface="Arial"/>
-        <a:font script="Bugi" typeface="Leelawadee UI"/>
-        <a:font script="Bopo" typeface="Microsoft JhengHei"/>
-        <a:font script="Java" typeface="Javanese Text"/>
-        <a:font script="Lisu" typeface="Segoe UI"/>
-        <a:font script="Mymr" typeface="Myanmar Text"/>
-        <a:font script="Nkoo" typeface="Ebrima"/>
-        <a:font script="Olck" typeface="Nirmala UI"/>
-        <a:font script="Osma" typeface="Ebrima"/>
-        <a:font script="Phag" typeface="Phagspa"/>
-        <a:font script="Syrn" typeface="Estrangelo Edessa"/>
-        <a:font script="Syrj" typeface="Estrangelo Edessa"/>
-        <a:font script="Syre" typeface="Estrangelo Edessa"/>
-        <a:font script="Sora" typeface="Nirmala UI"/>
-        <a:font script="Tale" typeface="Microsoft Tai Le"/>
-        <a:font script="Talu" typeface="Microsoft New Tai Lue"/>
-        <a:font script="Tfng" typeface="Ebrima"/>
       </a:majorFont>
       <a:minorFont>
         <a:latin typeface="Calibri" panose="020F0502020204030204"/>
@@ -4246,26 +3861,9 @@
         <a:font script="Viet" typeface="Arial"/>
         <a:font script="Uigh" typeface="Microsoft Uighur"/>
         <a:font script="Geor" typeface="Sylfaen"/>
-        <a:font script="Armn" typeface="Arial"/>
-        <a:font script="Bugi" typeface="Leelawadee UI"/>
-        <a:font script="Bopo" typeface="Microsoft JhengHei"/>
-        <a:font script="Java" typeface="Javanese Text"/>
-        <a:font script="Lisu" typeface="Segoe UI"/>
-        <a:font script="Mymr" typeface="Myanmar Text"/>
-        <a:font script="Nkoo" typeface="Ebrima"/>
-        <a:font script="Olck" typeface="Nirmala UI"/>
-        <a:font script="Osma" typeface="Ebrima"/>
-        <a:font script="Phag" typeface="Phagspa"/>
-        <a:font script="Syrn" typeface="Estrangelo Edessa"/>
-        <a:font script="Syrj" typeface="Estrangelo Edessa"/>
-        <a:font script="Syre" typeface="Estrangelo Edessa"/>
-        <a:font script="Sora" typeface="Nirmala UI"/>
-        <a:font script="Tale" typeface="Microsoft Tai Le"/>
-        <a:font script="Talu" typeface="Microsoft New Tai Lue"/>
-        <a:font script="Tfng" typeface="Ebrima"/>
       </a:minorFont>
     </a:fontScheme>
-    <a:fmtScheme name="Office">
+    <a:fmtScheme name="Office Theme">
       <a:fillStyleLst>
         <a:solidFill>
           <a:schemeClr val="phClr"/>
@@ -4407,7 +4005,7 @@
   <a:extraClrSchemeLst/>
   <a:extLst>
     <a:ext uri="{05A4C25C-085E-4340-85A3-A5531E510DB2}">
-      <thm15:themeFamily xmlns:thm15="http://schemas.microsoft.com/office/thememl/2012/main" name="Office Theme" id="{62F939B6-93AF-4DB8-9C6B-D6C7DFDC589F}" vid="{4A3C46E8-61CC-4603-A589-7422A47A8E4A}"/>
+      <thm15:themeFamily xmlns:thm15="http://schemas.microsoft.com/office/thememl/2012/main" name="Office Theme 2013 - 2022" id="{62F939B6-93AF-4DB8-9C6B-D6C7DFDC589F}" vid="{AE6F2518-B084-4896-AF52-66CC2144AA26}"/>
     </a:ext>
   </a:extLst>
 </a:theme>

</xml_diff>